<commit_message>
Added the presentation but still need to add video files
</commit_message>
<xml_diff>
--- a/Project/presentation/FinalPres.pptx
+++ b/Project/presentation/FinalPres.pptx
@@ -6,6 +6,14 @@
   </p:sldMasterIdLst>
   <p:sldIdLst>
     <p:sldId id="256" r:id="rId2"/>
+    <p:sldId id="257" r:id="rId3"/>
+    <p:sldId id="258" r:id="rId4"/>
+    <p:sldId id="262" r:id="rId5"/>
+    <p:sldId id="260" r:id="rId6"/>
+    <p:sldId id="259" r:id="rId7"/>
+    <p:sldId id="261" r:id="rId8"/>
+    <p:sldId id="263" r:id="rId9"/>
+    <p:sldId id="264" r:id="rId10"/>
   </p:sldIdLst>
   <p:sldSz cx="9144000" cy="6858000" type="screen4x3"/>
   <p:notesSz cx="6858000" cy="9144000"/>
@@ -3155,13 +3163,9 @@
           <a:p>
             <a:r>
               <a:rPr lang="en-US" dirty="0" smtClean="0"/>
-              <a:t>NLP/ML/</a:t>
-            </a:r>
-            <a:r>
-              <a:rPr lang="en-US" smtClean="0"/>
-              <a:t>Web Tech</a:t>
-            </a:r>
-            <a:endParaRPr lang="en-US"/>
+              <a:t>NLP/ML/Web Tech</a:t>
+            </a:r>
+            <a:endParaRPr lang="en-US" dirty="0"/>
           </a:p>
         </p:txBody>
       </p:sp>
@@ -3175,6 +3179,1197 @@
   <p:clrMapOvr>
     <a:masterClrMapping/>
   </p:clrMapOvr>
+  <p:timing>
+    <p:tnLst>
+      <p:par>
+        <p:cTn xmlns:p14="http://schemas.microsoft.com/office/powerpoint/2010/main" id="1" dur="indefinite" restart="never" nodeType="tmRoot"/>
+      </p:par>
+    </p:tnLst>
+  </p:timing>
+</p:sld>
+</file>
+
+<file path=ppt/slides/slide2.xml><?xml version="1.0" encoding="utf-8"?>
+<p:sld xmlns:a="http://schemas.openxmlformats.org/drawingml/2006/main" xmlns:r="http://schemas.openxmlformats.org/officeDocument/2006/relationships" xmlns:p="http://schemas.openxmlformats.org/presentationml/2006/main">
+  <p:cSld>
+    <p:spTree>
+      <p:nvGrpSpPr>
+        <p:cNvPr id="1" name=""/>
+        <p:cNvGrpSpPr/>
+        <p:nvPr/>
+      </p:nvGrpSpPr>
+      <p:grpSpPr>
+        <a:xfrm>
+          <a:off x="0" y="0"/>
+          <a:ext cx="0" cy="0"/>
+          <a:chOff x="0" y="0"/>
+          <a:chExt cx="0" cy="0"/>
+        </a:xfrm>
+      </p:grpSpPr>
+      <p:sp>
+        <p:nvSpPr>
+          <p:cNvPr id="2" name="Title 1"/>
+          <p:cNvSpPr>
+            <a:spLocks noGrp="1"/>
+          </p:cNvSpPr>
+          <p:nvPr>
+            <p:ph type="title"/>
+          </p:nvPr>
+        </p:nvSpPr>
+        <p:spPr/>
+        <p:txBody>
+          <a:bodyPr/>
+          <a:lstStyle/>
+          <a:p>
+            <a:r>
+              <a:rPr lang="en-US" dirty="0" smtClean="0"/>
+              <a:t>Project Goals</a:t>
+            </a:r>
+            <a:endParaRPr lang="en-US" dirty="0"/>
+          </a:p>
+        </p:txBody>
+      </p:sp>
+      <p:sp>
+        <p:nvSpPr>
+          <p:cNvPr id="3" name="Content Placeholder 2"/>
+          <p:cNvSpPr>
+            <a:spLocks noGrp="1"/>
+          </p:cNvSpPr>
+          <p:nvPr>
+            <p:ph idx="1"/>
+          </p:nvPr>
+        </p:nvSpPr>
+        <p:spPr/>
+        <p:txBody>
+          <a:bodyPr>
+            <a:normAutofit lnSpcReduction="10000"/>
+          </a:bodyPr>
+          <a:lstStyle/>
+          <a:p>
+            <a:r>
+              <a:rPr lang="en-US" dirty="0" smtClean="0"/>
+              <a:t>Analyze Sentiment in YouTube Videos</a:t>
+            </a:r>
+          </a:p>
+          <a:p>
+            <a:pPr lvl="1"/>
+            <a:r>
+              <a:rPr lang="en-US" dirty="0" smtClean="0"/>
+              <a:t>Automatic YouTube Downloader and Crawler</a:t>
+            </a:r>
+            <a:endParaRPr lang="en-US" dirty="0" smtClean="0"/>
+          </a:p>
+          <a:p>
+            <a:pPr lvl="1"/>
+            <a:r>
+              <a:rPr lang="en-US" dirty="0" smtClean="0"/>
+              <a:t>Multimodal Features:</a:t>
+            </a:r>
+          </a:p>
+          <a:p>
+            <a:pPr lvl="2"/>
+            <a:r>
+              <a:rPr lang="en-US" dirty="0" smtClean="0"/>
+              <a:t>Audio, Video, Transcript, Metadata/comments</a:t>
+            </a:r>
+          </a:p>
+          <a:p>
+            <a:pPr lvl="1"/>
+            <a:r>
+              <a:rPr lang="en-US" dirty="0" smtClean="0"/>
+              <a:t>Classification Schemes:</a:t>
+            </a:r>
+          </a:p>
+          <a:p>
+            <a:pPr lvl="2"/>
+            <a:r>
+              <a:rPr lang="en-US" dirty="0" smtClean="0"/>
+              <a:t>Single Modalities</a:t>
+            </a:r>
+          </a:p>
+          <a:p>
+            <a:pPr lvl="2"/>
+            <a:r>
+              <a:rPr lang="en-US" dirty="0" smtClean="0"/>
+              <a:t>Combined-Modalities and Co-Training</a:t>
+            </a:r>
+          </a:p>
+          <a:p>
+            <a:r>
+              <a:rPr lang="en-US" dirty="0" smtClean="0"/>
+              <a:t>Sentiment Rich Data-set</a:t>
+            </a:r>
+          </a:p>
+          <a:p>
+            <a:pPr lvl="1"/>
+            <a:r>
+              <a:rPr lang="en-US" dirty="0" smtClean="0"/>
+              <a:t>“React-To” videos</a:t>
+            </a:r>
+            <a:endParaRPr lang="en-US" dirty="0"/>
+          </a:p>
+        </p:txBody>
+      </p:sp>
+    </p:spTree>
+    <p:extLst>
+      <p:ext uri="{BB962C8B-B14F-4D97-AF65-F5344CB8AC3E}">
+        <p14:creationId xmlns:p14="http://schemas.microsoft.com/office/powerpoint/2010/main" val="585368102"/>
+      </p:ext>
+    </p:extLst>
+  </p:cSld>
+  <p:clrMapOvr>
+    <a:masterClrMapping/>
+  </p:clrMapOvr>
+  <p:timing>
+    <p:tnLst>
+      <p:par>
+        <p:cTn xmlns:p14="http://schemas.microsoft.com/office/powerpoint/2010/main" id="1" dur="indefinite" restart="never" nodeType="tmRoot"/>
+      </p:par>
+    </p:tnLst>
+  </p:timing>
+</p:sld>
+</file>
+
+<file path=ppt/slides/slide3.xml><?xml version="1.0" encoding="utf-8"?>
+<p:sld xmlns:a="http://schemas.openxmlformats.org/drawingml/2006/main" xmlns:r="http://schemas.openxmlformats.org/officeDocument/2006/relationships" xmlns:p="http://schemas.openxmlformats.org/presentationml/2006/main">
+  <p:cSld>
+    <p:spTree>
+      <p:nvGrpSpPr>
+        <p:cNvPr id="1" name=""/>
+        <p:cNvGrpSpPr/>
+        <p:nvPr/>
+      </p:nvGrpSpPr>
+      <p:grpSpPr>
+        <a:xfrm>
+          <a:off x="0" y="0"/>
+          <a:ext cx="0" cy="0"/>
+          <a:chOff x="0" y="0"/>
+          <a:chExt cx="0" cy="0"/>
+        </a:xfrm>
+      </p:grpSpPr>
+      <p:sp>
+        <p:nvSpPr>
+          <p:cNvPr id="2" name="Title 1"/>
+          <p:cNvSpPr>
+            <a:spLocks noGrp="1"/>
+          </p:cNvSpPr>
+          <p:nvPr>
+            <p:ph type="title"/>
+          </p:nvPr>
+        </p:nvSpPr>
+        <p:spPr/>
+        <p:txBody>
+          <a:bodyPr/>
+          <a:lstStyle/>
+          <a:p>
+            <a:r>
+              <a:rPr lang="en-US" dirty="0" smtClean="0"/>
+              <a:t>YouTube Downloader</a:t>
+            </a:r>
+            <a:endParaRPr lang="en-US" dirty="0"/>
+          </a:p>
+        </p:txBody>
+      </p:sp>
+      <p:sp>
+        <p:nvSpPr>
+          <p:cNvPr id="3" name="Content Placeholder 2"/>
+          <p:cNvSpPr>
+            <a:spLocks noGrp="1"/>
+          </p:cNvSpPr>
+          <p:nvPr>
+            <p:ph idx="1"/>
+          </p:nvPr>
+        </p:nvSpPr>
+        <p:spPr/>
+        <p:txBody>
+          <a:bodyPr/>
+          <a:lstStyle/>
+          <a:p>
+            <a:r>
+              <a:rPr lang="en-US" dirty="0" smtClean="0"/>
+              <a:t>Command Line Utility</a:t>
+            </a:r>
+          </a:p>
+          <a:p>
+            <a:pPr lvl="1"/>
+            <a:r>
+              <a:rPr lang="en-US" dirty="0" smtClean="0"/>
+              <a:t>Leverage “</a:t>
+            </a:r>
+            <a:r>
+              <a:rPr lang="en-US" dirty="0" err="1" smtClean="0"/>
+              <a:t>youtube</a:t>
+            </a:r>
+            <a:r>
+              <a:rPr lang="en-US" dirty="0" smtClean="0"/>
+              <a:t>-dl” and Google-APIs</a:t>
+            </a:r>
+          </a:p>
+          <a:p>
+            <a:r>
+              <a:rPr lang="en-US" dirty="0" smtClean="0"/>
+              <a:t>Capabilities:</a:t>
+            </a:r>
+          </a:p>
+          <a:p>
+            <a:pPr lvl="1"/>
+            <a:r>
+              <a:rPr lang="en-US" dirty="0" smtClean="0"/>
+              <a:t>Download comments, metadata, transcripts, and .mp4 formatted video</a:t>
+            </a:r>
+          </a:p>
+          <a:p>
+            <a:pPr lvl="1"/>
+            <a:r>
+              <a:rPr lang="en-US" dirty="0" smtClean="0"/>
+              <a:t>Download all videos for…</a:t>
+            </a:r>
+          </a:p>
+          <a:p>
+            <a:pPr lvl="2"/>
+            <a:r>
+              <a:rPr lang="en-US" dirty="0" smtClean="0"/>
+              <a:t>Search Query</a:t>
+            </a:r>
+          </a:p>
+          <a:p>
+            <a:pPr lvl="2"/>
+            <a:r>
+              <a:rPr lang="en-US" dirty="0" smtClean="0"/>
+              <a:t>User </a:t>
+            </a:r>
+          </a:p>
+          <a:p>
+            <a:pPr lvl="2"/>
+            <a:r>
+              <a:rPr lang="en-US" dirty="0" smtClean="0"/>
+              <a:t>Video ID</a:t>
+            </a:r>
+          </a:p>
+          <a:p>
+            <a:pPr lvl="2"/>
+            <a:endParaRPr lang="en-US" dirty="0" smtClean="0"/>
+          </a:p>
+        </p:txBody>
+      </p:sp>
+    </p:spTree>
+    <p:extLst>
+      <p:ext uri="{BB962C8B-B14F-4D97-AF65-F5344CB8AC3E}">
+        <p14:creationId xmlns:p14="http://schemas.microsoft.com/office/powerpoint/2010/main" val="2073167334"/>
+      </p:ext>
+    </p:extLst>
+  </p:cSld>
+  <p:clrMapOvr>
+    <a:masterClrMapping/>
+  </p:clrMapOvr>
+  <p:timing>
+    <p:tnLst>
+      <p:par>
+        <p:cTn xmlns:p14="http://schemas.microsoft.com/office/powerpoint/2010/main" id="1" dur="indefinite" restart="never" nodeType="tmRoot"/>
+      </p:par>
+    </p:tnLst>
+  </p:timing>
+</p:sld>
+</file>
+
+<file path=ppt/slides/slide4.xml><?xml version="1.0" encoding="utf-8"?>
+<p:sld xmlns:a="http://schemas.openxmlformats.org/drawingml/2006/main" xmlns:r="http://schemas.openxmlformats.org/officeDocument/2006/relationships" xmlns:p="http://schemas.openxmlformats.org/presentationml/2006/main">
+  <p:cSld>
+    <p:spTree>
+      <p:nvGrpSpPr>
+        <p:cNvPr id="1" name=""/>
+        <p:cNvGrpSpPr/>
+        <p:nvPr/>
+      </p:nvGrpSpPr>
+      <p:grpSpPr>
+        <a:xfrm>
+          <a:off x="0" y="0"/>
+          <a:ext cx="0" cy="0"/>
+          <a:chOff x="0" y="0"/>
+          <a:chExt cx="0" cy="0"/>
+        </a:xfrm>
+      </p:grpSpPr>
+      <p:sp>
+        <p:nvSpPr>
+          <p:cNvPr id="2" name="Title 1"/>
+          <p:cNvSpPr>
+            <a:spLocks noGrp="1"/>
+          </p:cNvSpPr>
+          <p:nvPr>
+            <p:ph type="title"/>
+          </p:nvPr>
+        </p:nvSpPr>
+        <p:spPr/>
+        <p:txBody>
+          <a:bodyPr/>
+          <a:lstStyle/>
+          <a:p>
+            <a:r>
+              <a:rPr lang="en-US" dirty="0" smtClean="0"/>
+              <a:t>Video Pre-Processing</a:t>
+            </a:r>
+            <a:endParaRPr lang="en-US" dirty="0"/>
+          </a:p>
+        </p:txBody>
+      </p:sp>
+      <p:sp>
+        <p:nvSpPr>
+          <p:cNvPr id="3" name="Content Placeholder 2"/>
+          <p:cNvSpPr>
+            <a:spLocks noGrp="1"/>
+          </p:cNvSpPr>
+          <p:nvPr>
+            <p:ph idx="1"/>
+          </p:nvPr>
+        </p:nvSpPr>
+        <p:spPr/>
+        <p:txBody>
+          <a:bodyPr/>
+          <a:lstStyle/>
+          <a:p>
+            <a:r>
+              <a:rPr lang="en-US" dirty="0" smtClean="0"/>
+              <a:t>Speaker </a:t>
+            </a:r>
+            <a:r>
+              <a:rPr lang="en-US" dirty="0" err="1" smtClean="0"/>
+              <a:t>Diarization</a:t>
+            </a:r>
+            <a:endParaRPr lang="en-US" dirty="0" smtClean="0"/>
+          </a:p>
+          <a:p>
+            <a:pPr lvl="1"/>
+            <a:r>
+              <a:rPr lang="en-US" dirty="0" smtClean="0"/>
+              <a:t>“</a:t>
+            </a:r>
+            <a:r>
+              <a:rPr lang="en-US" dirty="0" err="1" smtClean="0"/>
+              <a:t>SHoUT</a:t>
+            </a:r>
+            <a:r>
+              <a:rPr lang="en-US" dirty="0" smtClean="0"/>
+              <a:t>” toolkit used to perform speaker </a:t>
+            </a:r>
+            <a:r>
+              <a:rPr lang="en-US" dirty="0" err="1" smtClean="0"/>
+              <a:t>diarization</a:t>
+            </a:r>
+            <a:r>
+              <a:rPr lang="en-US" dirty="0" smtClean="0"/>
+              <a:t> on the videos.</a:t>
+            </a:r>
+          </a:p>
+          <a:p>
+            <a:pPr lvl="1"/>
+            <a:r>
+              <a:rPr lang="en-US" dirty="0" smtClean="0"/>
+              <a:t>Goal:  To create smaller videos with coherent sentiment</a:t>
+            </a:r>
+          </a:p>
+          <a:p>
+            <a:r>
+              <a:rPr lang="en-US" dirty="0" smtClean="0"/>
+              <a:t>Cut videos into shorter 5-10 second videos with only one speaker using </a:t>
+            </a:r>
+            <a:r>
+              <a:rPr lang="en-US" dirty="0" err="1" smtClean="0"/>
+              <a:t>ffmpeg</a:t>
+            </a:r>
+            <a:r>
+              <a:rPr lang="en-US" dirty="0" smtClean="0"/>
+              <a:t>.</a:t>
+            </a:r>
+            <a:endParaRPr lang="en-US" dirty="0"/>
+          </a:p>
+        </p:txBody>
+      </p:sp>
+    </p:spTree>
+    <p:extLst>
+      <p:ext uri="{BB962C8B-B14F-4D97-AF65-F5344CB8AC3E}">
+        <p14:creationId xmlns:p14="http://schemas.microsoft.com/office/powerpoint/2010/main" val="2530687651"/>
+      </p:ext>
+    </p:extLst>
+  </p:cSld>
+  <p:clrMapOvr>
+    <a:masterClrMapping/>
+  </p:clrMapOvr>
+  <p:timing>
+    <p:tnLst>
+      <p:par>
+        <p:cTn xmlns:p14="http://schemas.microsoft.com/office/powerpoint/2010/main" id="1" dur="indefinite" restart="never" nodeType="tmRoot"/>
+      </p:par>
+    </p:tnLst>
+  </p:timing>
+</p:sld>
+</file>
+
+<file path=ppt/slides/slide5.xml><?xml version="1.0" encoding="utf-8"?>
+<p:sld xmlns:a="http://schemas.openxmlformats.org/drawingml/2006/main" xmlns:r="http://schemas.openxmlformats.org/officeDocument/2006/relationships" xmlns:p="http://schemas.openxmlformats.org/presentationml/2006/main">
+  <p:cSld>
+    <p:spTree>
+      <p:nvGrpSpPr>
+        <p:cNvPr id="1" name=""/>
+        <p:cNvGrpSpPr/>
+        <p:nvPr/>
+      </p:nvGrpSpPr>
+      <p:grpSpPr>
+        <a:xfrm>
+          <a:off x="0" y="0"/>
+          <a:ext cx="0" cy="0"/>
+          <a:chOff x="0" y="0"/>
+          <a:chExt cx="0" cy="0"/>
+        </a:xfrm>
+      </p:grpSpPr>
+      <p:sp>
+        <p:nvSpPr>
+          <p:cNvPr id="2" name="Title 1"/>
+          <p:cNvSpPr>
+            <a:spLocks noGrp="1"/>
+          </p:cNvSpPr>
+          <p:nvPr>
+            <p:ph type="title"/>
+          </p:nvPr>
+        </p:nvSpPr>
+        <p:spPr/>
+        <p:txBody>
+          <a:bodyPr/>
+          <a:lstStyle/>
+          <a:p>
+            <a:r>
+              <a:rPr lang="en-US" dirty="0" smtClean="0"/>
+              <a:t>Video Examples</a:t>
+            </a:r>
+            <a:endParaRPr lang="en-US" dirty="0"/>
+          </a:p>
+        </p:txBody>
+      </p:sp>
+    </p:spTree>
+    <p:extLst>
+      <p:ext uri="{BB962C8B-B14F-4D97-AF65-F5344CB8AC3E}">
+        <p14:creationId xmlns:p14="http://schemas.microsoft.com/office/powerpoint/2010/main" val="396469090"/>
+      </p:ext>
+    </p:extLst>
+  </p:cSld>
+  <p:clrMapOvr>
+    <a:masterClrMapping/>
+  </p:clrMapOvr>
+  <p:timing>
+    <p:tnLst>
+      <p:par>
+        <p:cTn xmlns:p14="http://schemas.microsoft.com/office/powerpoint/2010/main" id="1" dur="indefinite" restart="never" nodeType="tmRoot"/>
+      </p:par>
+    </p:tnLst>
+  </p:timing>
+</p:sld>
+</file>
+
+<file path=ppt/slides/slide6.xml><?xml version="1.0" encoding="utf-8"?>
+<p:sld xmlns:a="http://schemas.openxmlformats.org/drawingml/2006/main" xmlns:r="http://schemas.openxmlformats.org/officeDocument/2006/relationships" xmlns:p="http://schemas.openxmlformats.org/presentationml/2006/main">
+  <p:cSld>
+    <p:spTree>
+      <p:nvGrpSpPr>
+        <p:cNvPr id="1" name=""/>
+        <p:cNvGrpSpPr/>
+        <p:nvPr/>
+      </p:nvGrpSpPr>
+      <p:grpSpPr>
+        <a:xfrm>
+          <a:off x="0" y="0"/>
+          <a:ext cx="0" cy="0"/>
+          <a:chOff x="0" y="0"/>
+          <a:chExt cx="0" cy="0"/>
+        </a:xfrm>
+      </p:grpSpPr>
+      <p:sp>
+        <p:nvSpPr>
+          <p:cNvPr id="2" name="Title 1"/>
+          <p:cNvSpPr>
+            <a:spLocks noGrp="1"/>
+          </p:cNvSpPr>
+          <p:nvPr>
+            <p:ph type="title"/>
+          </p:nvPr>
+        </p:nvSpPr>
+        <p:spPr/>
+        <p:txBody>
+          <a:bodyPr/>
+          <a:lstStyle/>
+          <a:p>
+            <a:r>
+              <a:rPr lang="en-US" dirty="0" smtClean="0"/>
+              <a:t>Visual Feature Extraction</a:t>
+            </a:r>
+            <a:endParaRPr lang="en-US" dirty="0"/>
+          </a:p>
+        </p:txBody>
+      </p:sp>
+      <p:sp>
+        <p:nvSpPr>
+          <p:cNvPr id="3" name="Content Placeholder 2"/>
+          <p:cNvSpPr>
+            <a:spLocks noGrp="1"/>
+          </p:cNvSpPr>
+          <p:nvPr>
+            <p:ph idx="1"/>
+          </p:nvPr>
+        </p:nvSpPr>
+        <p:spPr/>
+        <p:txBody>
+          <a:bodyPr>
+            <a:normAutofit fontScale="92500" lnSpcReduction="10000"/>
+          </a:bodyPr>
+          <a:lstStyle/>
+          <a:p>
+            <a:r>
+              <a:rPr lang="en-US" dirty="0" smtClean="0"/>
+              <a:t>Detect faces within the video</a:t>
+            </a:r>
+          </a:p>
+          <a:p>
+            <a:pPr lvl="1"/>
+            <a:r>
+              <a:rPr lang="en-US" dirty="0" smtClean="0"/>
+              <a:t>“Robust Real Time Face Detection” </a:t>
+            </a:r>
+            <a:r>
+              <a:rPr lang="en-US" i="1" dirty="0" smtClean="0"/>
+              <a:t>Viola, Jones 2013</a:t>
+            </a:r>
+          </a:p>
+          <a:p>
+            <a:r>
+              <a:rPr lang="en-US" dirty="0" smtClean="0"/>
+              <a:t>Detect landmarks on face area</a:t>
+            </a:r>
+          </a:p>
+          <a:p>
+            <a:pPr lvl="1"/>
+            <a:r>
+              <a:rPr lang="en-US" dirty="0" smtClean="0"/>
+              <a:t>“Detector of Facial Landmarks using the output of Structured SVM”, </a:t>
+            </a:r>
+            <a:r>
+              <a:rPr lang="en-US" i="1" dirty="0" err="1" smtClean="0"/>
+              <a:t>Uricar</a:t>
+            </a:r>
+            <a:r>
+              <a:rPr lang="en-US" i="1" dirty="0" smtClean="0"/>
+              <a:t>, et al. 2012</a:t>
+            </a:r>
+            <a:r>
+              <a:rPr lang="en-US" dirty="0" smtClean="0"/>
+              <a:t> </a:t>
+            </a:r>
+          </a:p>
+          <a:p>
+            <a:r>
+              <a:rPr lang="en-US" dirty="0" smtClean="0"/>
+              <a:t>Extract SIFT features from each landmark</a:t>
+            </a:r>
+          </a:p>
+          <a:p>
+            <a:pPr lvl="1"/>
+            <a:r>
+              <a:rPr lang="en-US" dirty="0" smtClean="0"/>
+              <a:t>“Object Recognition from local scale invariant features”, </a:t>
+            </a:r>
+            <a:r>
+              <a:rPr lang="en-US" i="1" dirty="0" smtClean="0"/>
+              <a:t>Lowe 1999</a:t>
+            </a:r>
+          </a:p>
+          <a:p>
+            <a:r>
+              <a:rPr lang="en-US" dirty="0" smtClean="0"/>
+              <a:t>Track average motion of face per frame for video clip</a:t>
+            </a:r>
+          </a:p>
+          <a:p>
+            <a:pPr lvl="1"/>
+            <a:endParaRPr lang="en-US" dirty="0"/>
+          </a:p>
+        </p:txBody>
+      </p:sp>
+    </p:spTree>
+    <p:extLst>
+      <p:ext uri="{BB962C8B-B14F-4D97-AF65-F5344CB8AC3E}">
+        <p14:creationId xmlns:p14="http://schemas.microsoft.com/office/powerpoint/2010/main" val="3527537083"/>
+      </p:ext>
+    </p:extLst>
+  </p:cSld>
+  <p:clrMapOvr>
+    <a:masterClrMapping/>
+  </p:clrMapOvr>
+  <p:timing>
+    <p:tnLst>
+      <p:par>
+        <p:cTn xmlns:p14="http://schemas.microsoft.com/office/powerpoint/2010/main" id="1" dur="indefinite" restart="never" nodeType="tmRoot"/>
+      </p:par>
+    </p:tnLst>
+  </p:timing>
+</p:sld>
+</file>
+
+<file path=ppt/slides/slide7.xml><?xml version="1.0" encoding="utf-8"?>
+<p:sld xmlns:a="http://schemas.openxmlformats.org/drawingml/2006/main" xmlns:r="http://schemas.openxmlformats.org/officeDocument/2006/relationships" xmlns:p="http://schemas.openxmlformats.org/presentationml/2006/main">
+  <p:cSld>
+    <p:spTree>
+      <p:nvGrpSpPr>
+        <p:cNvPr id="1" name=""/>
+        <p:cNvGrpSpPr/>
+        <p:nvPr/>
+      </p:nvGrpSpPr>
+      <p:grpSpPr>
+        <a:xfrm>
+          <a:off x="0" y="0"/>
+          <a:ext cx="0" cy="0"/>
+          <a:chOff x="0" y="0"/>
+          <a:chExt cx="0" cy="0"/>
+        </a:xfrm>
+      </p:grpSpPr>
+      <p:sp>
+        <p:nvSpPr>
+          <p:cNvPr id="2" name="Title 1"/>
+          <p:cNvSpPr>
+            <a:spLocks noGrp="1"/>
+          </p:cNvSpPr>
+          <p:nvPr>
+            <p:ph type="title"/>
+          </p:nvPr>
+        </p:nvSpPr>
+        <p:spPr/>
+        <p:txBody>
+          <a:bodyPr/>
+          <a:lstStyle/>
+          <a:p>
+            <a:r>
+              <a:rPr lang="en-US" dirty="0" smtClean="0"/>
+              <a:t>Visual Feature Extraction</a:t>
+            </a:r>
+            <a:endParaRPr lang="en-US" dirty="0"/>
+          </a:p>
+        </p:txBody>
+      </p:sp>
+      <p:pic>
+        <p:nvPicPr>
+          <p:cNvPr id="4" name="Picture 3" descr="Untitled.png"/>
+          <p:cNvPicPr>
+            <a:picLocks noChangeAspect="1"/>
+          </p:cNvPicPr>
+          <p:nvPr/>
+        </p:nvPicPr>
+        <p:blipFill>
+          <a:blip r:embed="rId2">
+            <a:extLst>
+              <a:ext uri="{28A0092B-C50C-407E-A947-70E740481C1C}">
+                <a14:useLocalDpi xmlns:a14="http://schemas.microsoft.com/office/drawing/2010/main" val="0"/>
+              </a:ext>
+            </a:extLst>
+          </a:blip>
+          <a:stretch>
+            <a:fillRect/>
+          </a:stretch>
+        </p:blipFill>
+        <p:spPr>
+          <a:xfrm>
+            <a:off x="457200" y="1417638"/>
+            <a:ext cx="3814998" cy="2317309"/>
+          </a:xfrm>
+          <a:prstGeom prst="rect">
+            <a:avLst/>
+          </a:prstGeom>
+        </p:spPr>
+      </p:pic>
+      <p:sp>
+        <p:nvSpPr>
+          <p:cNvPr id="5" name="TextBox 4"/>
+          <p:cNvSpPr txBox="1"/>
+          <p:nvPr/>
+        </p:nvSpPr>
+        <p:spPr>
+          <a:xfrm>
+            <a:off x="5251435" y="1693029"/>
+            <a:ext cx="2672727" cy="1569660"/>
+          </a:xfrm>
+          <a:prstGeom prst="rect">
+            <a:avLst/>
+          </a:prstGeom>
+          <a:noFill/>
+        </p:spPr>
+        <p:txBody>
+          <a:bodyPr wrap="none" rtlCol="0">
+            <a:spAutoFit/>
+          </a:bodyPr>
+          <a:lstStyle/>
+          <a:p>
+            <a:pPr algn="ctr"/>
+            <a:r>
+              <a:rPr lang="en-US" sz="3200" dirty="0" smtClean="0"/>
+              <a:t>Face Detection</a:t>
+            </a:r>
+          </a:p>
+          <a:p>
+            <a:pPr algn="ctr"/>
+            <a:r>
+              <a:rPr lang="en-US" sz="3200" dirty="0" smtClean="0"/>
+              <a:t> and </a:t>
+            </a:r>
+          </a:p>
+          <a:p>
+            <a:pPr algn="ctr"/>
+            <a:r>
+              <a:rPr lang="en-US" sz="3200" dirty="0" smtClean="0"/>
+              <a:t>Land-marking</a:t>
+            </a:r>
+            <a:endParaRPr lang="en-US" sz="3200" dirty="0"/>
+          </a:p>
+        </p:txBody>
+      </p:sp>
+      <p:cxnSp>
+        <p:nvCxnSpPr>
+          <p:cNvPr id="7" name="Straight Arrow Connector 6"/>
+          <p:cNvCxnSpPr/>
+          <p:nvPr/>
+        </p:nvCxnSpPr>
+        <p:spPr>
+          <a:xfrm>
+            <a:off x="4425204" y="3734947"/>
+            <a:ext cx="562780" cy="457115"/>
+          </a:xfrm>
+          <a:prstGeom prst="straightConnector1">
+            <a:avLst/>
+          </a:prstGeom>
+          <a:ln>
+            <a:tailEnd type="arrow"/>
+          </a:ln>
+        </p:spPr>
+        <p:style>
+          <a:lnRef idx="2">
+            <a:schemeClr val="accent1"/>
+          </a:lnRef>
+          <a:fillRef idx="0">
+            <a:schemeClr val="accent1"/>
+          </a:fillRef>
+          <a:effectRef idx="1">
+            <a:schemeClr val="accent1"/>
+          </a:effectRef>
+          <a:fontRef idx="minor">
+            <a:schemeClr val="tx1"/>
+          </a:fontRef>
+        </p:style>
+      </p:cxnSp>
+      <p:pic>
+        <p:nvPicPr>
+          <p:cNvPr id="8" name="Picture 7"/>
+          <p:cNvPicPr>
+            <a:picLocks noChangeAspect="1"/>
+          </p:cNvPicPr>
+          <p:nvPr/>
+        </p:nvPicPr>
+        <p:blipFill>
+          <a:blip r:embed="rId3"/>
+          <a:stretch>
+            <a:fillRect/>
+          </a:stretch>
+        </p:blipFill>
+        <p:spPr>
+          <a:xfrm>
+            <a:off x="4676575" y="4347726"/>
+            <a:ext cx="4304856" cy="2261731"/>
+          </a:xfrm>
+          <a:prstGeom prst="rect">
+            <a:avLst/>
+          </a:prstGeom>
+          <a:ln>
+            <a:solidFill>
+              <a:schemeClr val="tx1"/>
+            </a:solidFill>
+          </a:ln>
+        </p:spPr>
+      </p:pic>
+      <p:sp>
+        <p:nvSpPr>
+          <p:cNvPr id="10" name="TextBox 9"/>
+          <p:cNvSpPr txBox="1"/>
+          <p:nvPr/>
+        </p:nvSpPr>
+        <p:spPr>
+          <a:xfrm>
+            <a:off x="395535" y="5413607"/>
+            <a:ext cx="4029669" cy="584776"/>
+          </a:xfrm>
+          <a:prstGeom prst="rect">
+            <a:avLst/>
+          </a:prstGeom>
+          <a:noFill/>
+        </p:spPr>
+        <p:txBody>
+          <a:bodyPr wrap="none" rtlCol="0">
+            <a:spAutoFit/>
+          </a:bodyPr>
+          <a:lstStyle/>
+          <a:p>
+            <a:pPr algn="ctr"/>
+            <a:r>
+              <a:rPr lang="en-US" sz="3200" dirty="0" smtClean="0"/>
+              <a:t>SIFT Feature Extraction</a:t>
+            </a:r>
+          </a:p>
+        </p:txBody>
+      </p:sp>
+    </p:spTree>
+    <p:extLst>
+      <p:ext uri="{BB962C8B-B14F-4D97-AF65-F5344CB8AC3E}">
+        <p14:creationId xmlns:p14="http://schemas.microsoft.com/office/powerpoint/2010/main" val="2696533978"/>
+      </p:ext>
+    </p:extLst>
+  </p:cSld>
+  <p:clrMapOvr>
+    <a:masterClrMapping/>
+  </p:clrMapOvr>
+  <p:timing>
+    <p:tnLst>
+      <p:par>
+        <p:cTn xmlns:p14="http://schemas.microsoft.com/office/powerpoint/2010/main" id="1" dur="indefinite" restart="never" nodeType="tmRoot"/>
+      </p:par>
+    </p:tnLst>
+  </p:timing>
+</p:sld>
+</file>
+
+<file path=ppt/slides/slide8.xml><?xml version="1.0" encoding="utf-8"?>
+<p:sld xmlns:a="http://schemas.openxmlformats.org/drawingml/2006/main" xmlns:r="http://schemas.openxmlformats.org/officeDocument/2006/relationships" xmlns:p="http://schemas.openxmlformats.org/presentationml/2006/main">
+  <p:cSld>
+    <p:spTree>
+      <p:nvGrpSpPr>
+        <p:cNvPr id="1" name=""/>
+        <p:cNvGrpSpPr/>
+        <p:nvPr/>
+      </p:nvGrpSpPr>
+      <p:grpSpPr>
+        <a:xfrm>
+          <a:off x="0" y="0"/>
+          <a:ext cx="0" cy="0"/>
+          <a:chOff x="0" y="0"/>
+          <a:chExt cx="0" cy="0"/>
+        </a:xfrm>
+      </p:grpSpPr>
+      <p:sp>
+        <p:nvSpPr>
+          <p:cNvPr id="2" name="Title 1"/>
+          <p:cNvSpPr>
+            <a:spLocks noGrp="1"/>
+          </p:cNvSpPr>
+          <p:nvPr>
+            <p:ph type="title"/>
+          </p:nvPr>
+        </p:nvSpPr>
+        <p:spPr/>
+        <p:txBody>
+          <a:bodyPr/>
+          <a:lstStyle/>
+          <a:p>
+            <a:r>
+              <a:rPr lang="en-US" dirty="0" smtClean="0"/>
+              <a:t>Audio Feature Extraction</a:t>
+            </a:r>
+            <a:endParaRPr lang="en-US" dirty="0"/>
+          </a:p>
+        </p:txBody>
+      </p:sp>
+      <p:sp>
+        <p:nvSpPr>
+          <p:cNvPr id="3" name="Content Placeholder 2"/>
+          <p:cNvSpPr>
+            <a:spLocks noGrp="1"/>
+          </p:cNvSpPr>
+          <p:nvPr>
+            <p:ph idx="1"/>
+          </p:nvPr>
+        </p:nvSpPr>
+        <p:spPr/>
+        <p:txBody>
+          <a:bodyPr>
+            <a:normAutofit fontScale="70000" lnSpcReduction="20000"/>
+          </a:bodyPr>
+          <a:lstStyle/>
+          <a:p>
+            <a:r>
+              <a:rPr lang="en-US" dirty="0" smtClean="0"/>
+              <a:t>Energy Features</a:t>
+            </a:r>
+          </a:p>
+          <a:p>
+            <a:pPr lvl="1"/>
+            <a:r>
+              <a:rPr lang="en-US" dirty="0" smtClean="0"/>
+              <a:t>Energy of signal below 250 Hz</a:t>
+            </a:r>
+          </a:p>
+          <a:p>
+            <a:pPr lvl="1"/>
+            <a:r>
+              <a:rPr lang="en-US" dirty="0" smtClean="0"/>
+              <a:t>Energy of signal above 250 Hz</a:t>
+            </a:r>
+          </a:p>
+          <a:p>
+            <a:pPr lvl="1"/>
+            <a:r>
+              <a:rPr lang="en-US" dirty="0" smtClean="0"/>
+              <a:t>Energy of total signal</a:t>
+            </a:r>
+          </a:p>
+          <a:p>
+            <a:r>
+              <a:rPr lang="en-US" dirty="0" smtClean="0"/>
+              <a:t>Pitch Features</a:t>
+            </a:r>
+          </a:p>
+          <a:p>
+            <a:pPr lvl="1"/>
+            <a:r>
+              <a:rPr lang="en-US" dirty="0" smtClean="0"/>
+              <a:t>Fundamental Frequency below 1500Hz</a:t>
+            </a:r>
+          </a:p>
+          <a:p>
+            <a:pPr lvl="1"/>
+            <a:r>
+              <a:rPr lang="en-US" dirty="0" smtClean="0"/>
+              <a:t>Fundamental Frequency above 1500Hz</a:t>
+            </a:r>
+          </a:p>
+          <a:p>
+            <a:pPr lvl="1"/>
+            <a:r>
+              <a:rPr lang="en-US" dirty="0" smtClean="0"/>
+              <a:t>Fundamental Frequency of total signal</a:t>
+            </a:r>
+          </a:p>
+          <a:p>
+            <a:r>
+              <a:rPr lang="en-US" dirty="0" smtClean="0"/>
+              <a:t>Speech Features</a:t>
+            </a:r>
+          </a:p>
+          <a:p>
+            <a:pPr lvl="1"/>
+            <a:r>
+              <a:rPr lang="en-US" dirty="0" smtClean="0"/>
+              <a:t>13 MFCC </a:t>
+            </a:r>
+            <a:r>
+              <a:rPr lang="en-US" dirty="0" err="1" smtClean="0"/>
+              <a:t>coeffients</a:t>
+            </a:r>
+            <a:endParaRPr lang="en-US" dirty="0" smtClean="0"/>
+          </a:p>
+          <a:p>
+            <a:pPr marL="0" indent="0">
+              <a:buNone/>
+            </a:pPr>
+            <a:endParaRPr lang="en-US" dirty="0" smtClean="0"/>
+          </a:p>
+          <a:p>
+            <a:pPr marL="0" indent="0">
+              <a:buNone/>
+            </a:pPr>
+            <a:r>
+              <a:rPr lang="en-US" dirty="0" smtClean="0"/>
+              <a:t>[</a:t>
+            </a:r>
+            <a:r>
+              <a:rPr lang="en-US" dirty="0" smtClean="0"/>
+              <a:t>For each feature described below the mean, standard deviation, max and min across the frames for a video clip was extracted</a:t>
+            </a:r>
+            <a:r>
+              <a:rPr lang="en-US" dirty="0"/>
+              <a:t>]</a:t>
+            </a:r>
+            <a:endParaRPr lang="en-US" dirty="0" smtClean="0"/>
+          </a:p>
+        </p:txBody>
+      </p:sp>
+    </p:spTree>
+    <p:extLst>
+      <p:ext uri="{BB962C8B-B14F-4D97-AF65-F5344CB8AC3E}">
+        <p14:creationId xmlns:p14="http://schemas.microsoft.com/office/powerpoint/2010/main" val="611635197"/>
+      </p:ext>
+    </p:extLst>
+  </p:cSld>
+  <p:clrMapOvr>
+    <a:masterClrMapping/>
+  </p:clrMapOvr>
+  <p:timing>
+    <p:tnLst>
+      <p:par>
+        <p:cTn xmlns:p14="http://schemas.microsoft.com/office/powerpoint/2010/main" id="1" dur="indefinite" restart="never" nodeType="tmRoot"/>
+      </p:par>
+    </p:tnLst>
+  </p:timing>
+</p:sld>
+</file>
+
+<file path=ppt/slides/slide9.xml><?xml version="1.0" encoding="utf-8"?>
+<p:sld xmlns:a="http://schemas.openxmlformats.org/drawingml/2006/main" xmlns:r="http://schemas.openxmlformats.org/officeDocument/2006/relationships" xmlns:p="http://schemas.openxmlformats.org/presentationml/2006/main">
+  <p:cSld>
+    <p:spTree>
+      <p:nvGrpSpPr>
+        <p:cNvPr id="1" name=""/>
+        <p:cNvGrpSpPr/>
+        <p:nvPr/>
+      </p:nvGrpSpPr>
+      <p:grpSpPr>
+        <a:xfrm>
+          <a:off x="0" y="0"/>
+          <a:ext cx="0" cy="0"/>
+          <a:chOff x="0" y="0"/>
+          <a:chExt cx="0" cy="0"/>
+        </a:xfrm>
+      </p:grpSpPr>
+      <p:sp>
+        <p:nvSpPr>
+          <p:cNvPr id="2" name="Title 1"/>
+          <p:cNvSpPr>
+            <a:spLocks noGrp="1"/>
+          </p:cNvSpPr>
+          <p:nvPr>
+            <p:ph type="title"/>
+          </p:nvPr>
+        </p:nvSpPr>
+        <p:spPr/>
+        <p:txBody>
+          <a:bodyPr>
+            <a:normAutofit fontScale="90000"/>
+          </a:bodyPr>
+          <a:lstStyle/>
+          <a:p>
+            <a:r>
+              <a:rPr lang="en-US" dirty="0" smtClean="0"/>
+              <a:t>Audio and Visual Classification Results</a:t>
+            </a:r>
+            <a:endParaRPr lang="en-US" dirty="0"/>
+          </a:p>
+        </p:txBody>
+      </p:sp>
+      <p:sp>
+        <p:nvSpPr>
+          <p:cNvPr id="3" name="Content Placeholder 2"/>
+          <p:cNvSpPr>
+            <a:spLocks noGrp="1"/>
+          </p:cNvSpPr>
+          <p:nvPr>
+            <p:ph idx="1"/>
+          </p:nvPr>
+        </p:nvSpPr>
+        <p:spPr/>
+        <p:txBody>
+          <a:bodyPr>
+            <a:normAutofit lnSpcReduction="10000"/>
+          </a:bodyPr>
+          <a:lstStyle/>
+          <a:p>
+            <a:r>
+              <a:rPr lang="en-US" dirty="0" smtClean="0"/>
+              <a:t>90/10 Cross-Validation</a:t>
+            </a:r>
+          </a:p>
+          <a:p>
+            <a:pPr lvl="1"/>
+            <a:r>
+              <a:rPr lang="en-US" dirty="0" smtClean="0"/>
+              <a:t>Average </a:t>
+            </a:r>
+            <a:r>
+              <a:rPr lang="en-US" dirty="0"/>
+              <a:t>a</a:t>
+            </a:r>
+            <a:r>
+              <a:rPr lang="en-US" dirty="0" smtClean="0"/>
+              <a:t>ccuracy over 100 test splits</a:t>
+            </a:r>
+          </a:p>
+          <a:p>
+            <a:pPr lvl="1"/>
+            <a:r>
+              <a:rPr lang="en-US" dirty="0" smtClean="0"/>
+              <a:t>RBF SVM-Classification (lib-</a:t>
+            </a:r>
+            <a:r>
+              <a:rPr lang="en-US" dirty="0" err="1" smtClean="0"/>
+              <a:t>svm</a:t>
+            </a:r>
+            <a:r>
+              <a:rPr lang="en-US" dirty="0" smtClean="0"/>
+              <a:t>)</a:t>
+            </a:r>
+          </a:p>
+          <a:p>
+            <a:r>
+              <a:rPr lang="en-US" dirty="0" smtClean="0"/>
+              <a:t>Audio-Only Feature Classification</a:t>
+            </a:r>
+          </a:p>
+          <a:p>
+            <a:pPr lvl="1"/>
+            <a:r>
+              <a:rPr lang="en-US" dirty="0" smtClean="0"/>
+              <a:t>3-way: 47% </a:t>
+            </a:r>
+          </a:p>
+          <a:p>
+            <a:pPr lvl="1"/>
+            <a:r>
+              <a:rPr lang="en-US" dirty="0" smtClean="0"/>
+              <a:t>Binary: 62% </a:t>
+            </a:r>
+          </a:p>
+          <a:p>
+            <a:r>
+              <a:rPr lang="en-US" dirty="0" smtClean="0"/>
+              <a:t>Visual-Only Feature Classification</a:t>
+            </a:r>
+          </a:p>
+          <a:p>
+            <a:pPr lvl="1"/>
+            <a:r>
+              <a:rPr lang="en-US" dirty="0" smtClean="0"/>
+              <a:t>3-way: 53% </a:t>
+            </a:r>
+          </a:p>
+          <a:p>
+            <a:pPr lvl="1"/>
+            <a:r>
+              <a:rPr lang="en-US" dirty="0" smtClean="0"/>
+              <a:t>Binary</a:t>
+            </a:r>
+            <a:r>
+              <a:rPr lang="en-US" smtClean="0"/>
+              <a:t>: 63%</a:t>
+            </a:r>
+            <a:endParaRPr lang="en-US" dirty="0"/>
+          </a:p>
+        </p:txBody>
+      </p:sp>
+    </p:spTree>
+    <p:extLst>
+      <p:ext uri="{BB962C8B-B14F-4D97-AF65-F5344CB8AC3E}">
+        <p14:creationId xmlns:p14="http://schemas.microsoft.com/office/powerpoint/2010/main" val="2228716867"/>
+      </p:ext>
+    </p:extLst>
+  </p:cSld>
+  <p:clrMapOvr>
+    <a:masterClrMapping/>
+  </p:clrMapOvr>
+  <p:timing>
+    <p:tnLst>
+      <p:par>
+        <p:cTn xmlns:p14="http://schemas.microsoft.com/office/powerpoint/2010/main" id="1" dur="indefinite" restart="never" nodeType="tmRoot"/>
+      </p:par>
+    </p:tnLst>
+  </p:timing>
 </p:sld>
 </file>
 

</xml_diff>

<commit_message>
Added new changes to the latex file and finished the first portion of the paper
</commit_message>
<xml_diff>
--- a/Project/presentation/FinalPres.pptx
+++ b/Project/presentation/FinalPres.pptx
@@ -297,7 +297,7 @@
           <a:p>
             <a:fld id="{B79E8038-5A95-A643-A3D4-87ABCE88466E}" type="datetimeFigureOut">
               <a:rPr lang="en-US" smtClean="0"/>
-              <a:t>12/8/13</a:t>
+              <a:t>12/9/2013</a:t>
             </a:fld>
             <a:endParaRPr lang="en-US"/>
           </a:p>
@@ -467,7 +467,7 @@
           <a:p>
             <a:fld id="{B79E8038-5A95-A643-A3D4-87ABCE88466E}" type="datetimeFigureOut">
               <a:rPr lang="en-US" smtClean="0"/>
-              <a:t>12/8/13</a:t>
+              <a:t>12/9/2013</a:t>
             </a:fld>
             <a:endParaRPr lang="en-US"/>
           </a:p>
@@ -647,7 +647,7 @@
           <a:p>
             <a:fld id="{B79E8038-5A95-A643-A3D4-87ABCE88466E}" type="datetimeFigureOut">
               <a:rPr lang="en-US" smtClean="0"/>
-              <a:t>12/8/13</a:t>
+              <a:t>12/9/2013</a:t>
             </a:fld>
             <a:endParaRPr lang="en-US"/>
           </a:p>
@@ -817,7 +817,7 @@
           <a:p>
             <a:fld id="{B79E8038-5A95-A643-A3D4-87ABCE88466E}" type="datetimeFigureOut">
               <a:rPr lang="en-US" smtClean="0"/>
-              <a:t>12/8/13</a:t>
+              <a:t>12/9/2013</a:t>
             </a:fld>
             <a:endParaRPr lang="en-US"/>
           </a:p>
@@ -1063,7 +1063,7 @@
           <a:p>
             <a:fld id="{B79E8038-5A95-A643-A3D4-87ABCE88466E}" type="datetimeFigureOut">
               <a:rPr lang="en-US" smtClean="0"/>
-              <a:t>12/8/13</a:t>
+              <a:t>12/9/2013</a:t>
             </a:fld>
             <a:endParaRPr lang="en-US"/>
           </a:p>
@@ -1351,7 +1351,7 @@
           <a:p>
             <a:fld id="{B79E8038-5A95-A643-A3D4-87ABCE88466E}" type="datetimeFigureOut">
               <a:rPr lang="en-US" smtClean="0"/>
-              <a:t>12/8/13</a:t>
+              <a:t>12/9/2013</a:t>
             </a:fld>
             <a:endParaRPr lang="en-US"/>
           </a:p>
@@ -1773,7 +1773,7 @@
           <a:p>
             <a:fld id="{B79E8038-5A95-A643-A3D4-87ABCE88466E}" type="datetimeFigureOut">
               <a:rPr lang="en-US" smtClean="0"/>
-              <a:t>12/8/13</a:t>
+              <a:t>12/9/2013</a:t>
             </a:fld>
             <a:endParaRPr lang="en-US"/>
           </a:p>
@@ -1891,7 +1891,7 @@
           <a:p>
             <a:fld id="{B79E8038-5A95-A643-A3D4-87ABCE88466E}" type="datetimeFigureOut">
               <a:rPr lang="en-US" smtClean="0"/>
-              <a:t>12/8/13</a:t>
+              <a:t>12/9/2013</a:t>
             </a:fld>
             <a:endParaRPr lang="en-US"/>
           </a:p>
@@ -1986,7 +1986,7 @@
           <a:p>
             <a:fld id="{B79E8038-5A95-A643-A3D4-87ABCE88466E}" type="datetimeFigureOut">
               <a:rPr lang="en-US" smtClean="0"/>
-              <a:t>12/8/13</a:t>
+              <a:t>12/9/2013</a:t>
             </a:fld>
             <a:endParaRPr lang="en-US"/>
           </a:p>
@@ -2263,7 +2263,7 @@
           <a:p>
             <a:fld id="{B79E8038-5A95-A643-A3D4-87ABCE88466E}" type="datetimeFigureOut">
               <a:rPr lang="en-US" smtClean="0"/>
-              <a:t>12/8/13</a:t>
+              <a:t>12/9/2013</a:t>
             </a:fld>
             <a:endParaRPr lang="en-US"/>
           </a:p>
@@ -2516,7 +2516,7 @@
           <a:p>
             <a:fld id="{B79E8038-5A95-A643-A3D4-87ABCE88466E}" type="datetimeFigureOut">
               <a:rPr lang="en-US" smtClean="0"/>
-              <a:t>12/8/13</a:t>
+              <a:t>12/9/2013</a:t>
             </a:fld>
             <a:endParaRPr lang="en-US"/>
           </a:p>
@@ -2729,7 +2729,7 @@
           <a:p>
             <a:fld id="{B79E8038-5A95-A643-A3D4-87ABCE88466E}" type="datetimeFigureOut">
               <a:rPr lang="en-US" smtClean="0"/>
-              <a:t>12/8/13</a:t>
+              <a:t>12/9/2013</a:t>
             </a:fld>
             <a:endParaRPr lang="en-US"/>
           </a:p>
@@ -3183,7 +3183,7 @@
   <p:timing>
     <p:tnLst>
       <p:par>
-        <p:cTn xmlns:p14="http://schemas.microsoft.com/office/powerpoint/2010/main" id="1" dur="indefinite" restart="never" nodeType="tmRoot"/>
+        <p:cTn id="1" dur="indefinite" restart="never" nodeType="tmRoot"/>
       </p:par>
     </p:tnLst>
   </p:timing>
@@ -3226,11 +3226,7 @@
           <a:p>
             <a:r>
               <a:rPr lang="en-US" dirty="0" smtClean="0"/>
-              <a:t>Classification </a:t>
-            </a:r>
-            <a:r>
-              <a:rPr lang="en-US" dirty="0" smtClean="0"/>
-              <a:t>Results</a:t>
+              <a:t>Classification Results</a:t>
             </a:r>
             <a:endParaRPr lang="en-US" dirty="0"/>
           </a:p>
@@ -3311,11 +3307,7 @@
           <a:p>
             <a:r>
               <a:rPr lang="en-US" dirty="0" smtClean="0"/>
-              <a:t>Visual-Only Feature </a:t>
-            </a:r>
-            <a:r>
-              <a:rPr lang="en-US" dirty="0" smtClean="0"/>
-              <a:t>Classification</a:t>
+              <a:t>Visual-Only Feature Classification</a:t>
             </a:r>
           </a:p>
           <a:p>
@@ -3335,7 +3327,6 @@
               <a:rPr lang="en-US" dirty="0" smtClean="0"/>
               <a:t>%</a:t>
             </a:r>
-            <a:endParaRPr lang="en-US" dirty="0" smtClean="0"/>
           </a:p>
           <a:p>
             <a:r>
@@ -3356,7 +3347,6 @@
               <a:rPr lang="en-US" dirty="0" smtClean="0"/>
               <a:t>Binary: 65%</a:t>
             </a:r>
-            <a:endParaRPr lang="en-US" dirty="0" smtClean="0"/>
           </a:p>
           <a:p>
             <a:pPr marL="457200" lvl="1" indent="0">
@@ -3379,7 +3369,7 @@
   <p:timing>
     <p:tnLst>
       <p:par>
-        <p:cTn xmlns:p14="http://schemas.microsoft.com/office/powerpoint/2010/main" id="1" dur="indefinite" restart="never" nodeType="tmRoot"/>
+        <p:cTn id="1" dur="indefinite" restart="never" nodeType="tmRoot"/>
       </p:par>
     </p:tnLst>
   </p:timing>
@@ -3519,7 +3509,7 @@
   <p:timing>
     <p:tnLst>
       <p:par>
-        <p:cTn xmlns:p14="http://schemas.microsoft.com/office/powerpoint/2010/main" id="1" dur="indefinite" restart="never" nodeType="tmRoot"/>
+        <p:cTn id="1" dur="indefinite" restart="never" nodeType="tmRoot"/>
       </p:par>
     </p:tnLst>
   </p:timing>
@@ -3661,7 +3651,7 @@
   <p:timing>
     <p:tnLst>
       <p:par>
-        <p:cTn xmlns:p14="http://schemas.microsoft.com/office/powerpoint/2010/main" id="1" dur="indefinite" restart="never" nodeType="tmRoot"/>
+        <p:cTn id="1" dur="indefinite" restart="never" nodeType="tmRoot"/>
       </p:par>
     </p:tnLst>
   </p:timing>
@@ -3702,11 +3692,7 @@
           <a:p>
             <a:r>
               <a:rPr lang="en-US" dirty="0" smtClean="0"/>
-              <a:t>Pre</a:t>
-            </a:r>
-            <a:r>
-              <a:rPr lang="en-US" dirty="0" smtClean="0"/>
-              <a:t>-Processing</a:t>
+              <a:t>Pre-Processing</a:t>
             </a:r>
             <a:endParaRPr lang="en-US" dirty="0"/>
           </a:p>
@@ -3805,7 +3791,7 @@
   <p:timing>
     <p:tnLst>
       <p:par>
-        <p:cTn xmlns:p14="http://schemas.microsoft.com/office/powerpoint/2010/main" id="1" dur="indefinite" restart="never" nodeType="tmRoot"/>
+        <p:cTn id="1" dur="indefinite" restart="never" nodeType="tmRoot"/>
       </p:par>
     </p:tnLst>
   </p:timing>
@@ -3852,6 +3838,39 @@
           </a:p>
         </p:txBody>
       </p:sp>
+      <p:pic>
+        <p:nvPicPr>
+          <p:cNvPr id="3" name="concat_vid.mp4">
+            <a:hlinkClick r:id="" action="ppaction://media"/>
+          </p:cNvPr>
+          <p:cNvPicPr>
+            <a:picLocks noChangeAspect="1"/>
+          </p:cNvPicPr>
+          <p:nvPr>
+            <a:videoFile r:link="rId2"/>
+            <p:extLst>
+              <p:ext uri="{DAA4B4D4-6D71-4841-9C94-3DE7FCFB9230}">
+                <p14:media xmlns:p14="http://schemas.microsoft.com/office/powerpoint/2010/main" r:embed="rId1"/>
+              </p:ext>
+            </p:extLst>
+          </p:nvPr>
+        </p:nvPicPr>
+        <p:blipFill>
+          <a:blip r:embed="rId4"/>
+          <a:stretch>
+            <a:fillRect/>
+          </a:stretch>
+        </p:blipFill>
+        <p:spPr>
+          <a:xfrm>
+            <a:off x="1524000" y="1143000"/>
+            <a:ext cx="6096000" cy="4572000"/>
+          </a:xfrm>
+          <a:prstGeom prst="rect">
+            <a:avLst/>
+          </a:prstGeom>
+        </p:spPr>
+      </p:pic>
     </p:spTree>
     <p:extLst>
       <p:ext uri="{BB962C8B-B14F-4D97-AF65-F5344CB8AC3E}">
@@ -3865,7 +3884,80 @@
   <p:timing>
     <p:tnLst>
       <p:par>
-        <p:cTn xmlns:p14="http://schemas.microsoft.com/office/powerpoint/2010/main" id="1" dur="indefinite" restart="never" nodeType="tmRoot"/>
+        <p:cTn id="1" dur="indefinite" restart="never" nodeType="tmRoot">
+          <p:childTnLst>
+            <p:seq concurrent="1" nextAc="seek">
+              <p:cTn id="2" restart="whenNotActive" fill="hold" evtFilter="cancelBubble" nodeType="interactiveSeq">
+                <p:stCondLst>
+                  <p:cond evt="onClick" delay="0">
+                    <p:tgtEl>
+                      <p:spTgt spid="3"/>
+                    </p:tgtEl>
+                  </p:cond>
+                </p:stCondLst>
+                <p:endSync evt="end" delay="0">
+                  <p:rtn val="all"/>
+                </p:endSync>
+                <p:childTnLst>
+                  <p:par>
+                    <p:cTn id="3" fill="hold">
+                      <p:stCondLst>
+                        <p:cond delay="0"/>
+                      </p:stCondLst>
+                      <p:childTnLst>
+                        <p:par>
+                          <p:cTn id="4" fill="hold">
+                            <p:stCondLst>
+                              <p:cond delay="0"/>
+                            </p:stCondLst>
+                            <p:childTnLst>
+                              <p:par>
+                                <p:cTn id="5" presetID="2" presetClass="mediacall" presetSubtype="0" fill="hold" nodeType="clickEffect">
+                                  <p:stCondLst>
+                                    <p:cond delay="0"/>
+                                  </p:stCondLst>
+                                  <p:childTnLst>
+                                    <p:cmd type="call" cmd="togglePause">
+                                      <p:cBhvr>
+                                        <p:cTn id="6" dur="1" fill="hold"/>
+                                        <p:tgtEl>
+                                          <p:spTgt spid="3"/>
+                                        </p:tgtEl>
+                                      </p:cBhvr>
+                                    </p:cmd>
+                                  </p:childTnLst>
+                                </p:cTn>
+                              </p:par>
+                            </p:childTnLst>
+                          </p:cTn>
+                        </p:par>
+                      </p:childTnLst>
+                    </p:cTn>
+                  </p:par>
+                </p:childTnLst>
+              </p:cTn>
+              <p:nextCondLst>
+                <p:cond evt="onClick" delay="0">
+                  <p:tgtEl>
+                    <p:spTgt spid="3"/>
+                  </p:tgtEl>
+                </p:cond>
+              </p:nextCondLst>
+            </p:seq>
+            <p:video>
+              <p:cMediaNode vol="80000">
+                <p:cTn id="7" fill="hold" display="0">
+                  <p:stCondLst>
+                    <p:cond delay="indefinite"/>
+                  </p:stCondLst>
+                </p:cTn>
+                <p:tgtEl>
+                  <p:spTgt spid="3"/>
+                </p:tgtEl>
+              </p:cMediaNode>
+            </p:video>
+          </p:childTnLst>
+        </p:cTn>
       </p:par>
     </p:tnLst>
   </p:timing>
@@ -4012,7 +4104,7 @@
   <p:timing>
     <p:tnLst>
       <p:par>
-        <p:cTn xmlns:p14="http://schemas.microsoft.com/office/powerpoint/2010/main" id="1" dur="indefinite" restart="never" nodeType="tmRoot"/>
+        <p:cTn id="1" dur="indefinite" restart="never" nodeType="tmRoot"/>
       </p:par>
     </p:tnLst>
   </p:timing>
@@ -4239,7 +4331,7 @@
   <p:timing>
     <p:tnLst>
       <p:par>
-        <p:cTn xmlns:p14="http://schemas.microsoft.com/office/powerpoint/2010/main" id="1" dur="indefinite" restart="never" nodeType="tmRoot"/>
+        <p:cTn id="1" dur="indefinite" restart="never" nodeType="tmRoot"/>
       </p:par>
     </p:tnLst>
   </p:timing>
@@ -4409,7 +4501,7 @@
   <p:timing>
     <p:tnLst>
       <p:par>
-        <p:cTn xmlns:p14="http://schemas.microsoft.com/office/powerpoint/2010/main" id="1" dur="indefinite" restart="never" nodeType="tmRoot"/>
+        <p:cTn id="1" dur="indefinite" restart="never" nodeType="tmRoot"/>
       </p:par>
     </p:tnLst>
   </p:timing>

</xml_diff>